<commit_message>
add builtin_pb; add zone into messageAgent
</commit_message>
<xml_diff>
--- a/doc/SoftwareDesign/Orchestration/OrchestrationDesign.pptx
+++ b/doc/SoftwareDesign/Orchestration/OrchestrationDesign.pptx
@@ -7,14 +7,6 @@
   <p:sldIdLst>
     <p:sldId id="256" r:id="rId2"/>
     <p:sldId id="277" r:id="rId3"/>
-    <p:sldId id="276" r:id="rId4"/>
-    <p:sldId id="257" r:id="rId5"/>
-    <p:sldId id="278" r:id="rId6"/>
-    <p:sldId id="280" r:id="rId7"/>
-    <p:sldId id="279" r:id="rId8"/>
-    <p:sldId id="265" r:id="rId9"/>
-    <p:sldId id="281" r:id="rId10"/>
-    <p:sldId id="266" r:id="rId11"/>
   </p:sldIdLst>
   <p:sldSz cx="12192000" cy="6858000"/>
   <p:notesSz cx="6858000" cy="9144000"/>
@@ -268,7 +260,7 @@
           <a:p>
             <a:fld id="{BDB1D72C-B286-4D77-AB41-B65B0FF94B7D}" type="datetimeFigureOut">
               <a:rPr lang="zh-CN" altLang="en-US" smtClean="0"/>
-              <a:t>2020/8/2</a:t>
+              <a:t>2020/9/8</a:t>
             </a:fld>
             <a:endParaRPr lang="zh-CN" altLang="en-US"/>
           </a:p>
@@ -466,7 +458,7 @@
           <a:p>
             <a:fld id="{BDB1D72C-B286-4D77-AB41-B65B0FF94B7D}" type="datetimeFigureOut">
               <a:rPr lang="zh-CN" altLang="en-US" smtClean="0"/>
-              <a:t>2020/8/2</a:t>
+              <a:t>2020/9/8</a:t>
             </a:fld>
             <a:endParaRPr lang="zh-CN" altLang="en-US"/>
           </a:p>
@@ -674,7 +666,7 @@
           <a:p>
             <a:fld id="{BDB1D72C-B286-4D77-AB41-B65B0FF94B7D}" type="datetimeFigureOut">
               <a:rPr lang="zh-CN" altLang="en-US" smtClean="0"/>
-              <a:t>2020/8/2</a:t>
+              <a:t>2020/9/8</a:t>
             </a:fld>
             <a:endParaRPr lang="zh-CN" altLang="en-US"/>
           </a:p>
@@ -872,7 +864,7 @@
           <a:p>
             <a:fld id="{BDB1D72C-B286-4D77-AB41-B65B0FF94B7D}" type="datetimeFigureOut">
               <a:rPr lang="zh-CN" altLang="en-US" smtClean="0"/>
-              <a:t>2020/8/2</a:t>
+              <a:t>2020/9/8</a:t>
             </a:fld>
             <a:endParaRPr lang="zh-CN" altLang="en-US"/>
           </a:p>
@@ -1147,7 +1139,7 @@
           <a:p>
             <a:fld id="{BDB1D72C-B286-4D77-AB41-B65B0FF94B7D}" type="datetimeFigureOut">
               <a:rPr lang="zh-CN" altLang="en-US" smtClean="0"/>
-              <a:t>2020/8/2</a:t>
+              <a:t>2020/9/8</a:t>
             </a:fld>
             <a:endParaRPr lang="zh-CN" altLang="en-US"/>
           </a:p>
@@ -1412,7 +1404,7 @@
           <a:p>
             <a:fld id="{BDB1D72C-B286-4D77-AB41-B65B0FF94B7D}" type="datetimeFigureOut">
               <a:rPr lang="zh-CN" altLang="en-US" smtClean="0"/>
-              <a:t>2020/8/2</a:t>
+              <a:t>2020/9/8</a:t>
             </a:fld>
             <a:endParaRPr lang="zh-CN" altLang="en-US"/>
           </a:p>
@@ -1824,7 +1816,7 @@
           <a:p>
             <a:fld id="{BDB1D72C-B286-4D77-AB41-B65B0FF94B7D}" type="datetimeFigureOut">
               <a:rPr lang="zh-CN" altLang="en-US" smtClean="0"/>
-              <a:t>2020/8/2</a:t>
+              <a:t>2020/9/8</a:t>
             </a:fld>
             <a:endParaRPr lang="zh-CN" altLang="en-US"/>
           </a:p>
@@ -1965,7 +1957,7 @@
           <a:p>
             <a:fld id="{BDB1D72C-B286-4D77-AB41-B65B0FF94B7D}" type="datetimeFigureOut">
               <a:rPr lang="zh-CN" altLang="en-US" smtClean="0"/>
-              <a:t>2020/8/2</a:t>
+              <a:t>2020/9/8</a:t>
             </a:fld>
             <a:endParaRPr lang="zh-CN" altLang="en-US"/>
           </a:p>
@@ -2078,7 +2070,7 @@
           <a:p>
             <a:fld id="{BDB1D72C-B286-4D77-AB41-B65B0FF94B7D}" type="datetimeFigureOut">
               <a:rPr lang="zh-CN" altLang="en-US" smtClean="0"/>
-              <a:t>2020/8/2</a:t>
+              <a:t>2020/9/8</a:t>
             </a:fld>
             <a:endParaRPr lang="zh-CN" altLang="en-US"/>
           </a:p>
@@ -2389,7 +2381,7 @@
           <a:p>
             <a:fld id="{BDB1D72C-B286-4D77-AB41-B65B0FF94B7D}" type="datetimeFigureOut">
               <a:rPr lang="zh-CN" altLang="en-US" smtClean="0"/>
-              <a:t>2020/8/2</a:t>
+              <a:t>2020/9/8</a:t>
             </a:fld>
             <a:endParaRPr lang="zh-CN" altLang="en-US"/>
           </a:p>
@@ -2677,7 +2669,7 @@
           <a:p>
             <a:fld id="{BDB1D72C-B286-4D77-AB41-B65B0FF94B7D}" type="datetimeFigureOut">
               <a:rPr lang="zh-CN" altLang="en-US" smtClean="0"/>
-              <a:t>2020/8/2</a:t>
+              <a:t>2020/9/8</a:t>
             </a:fld>
             <a:endParaRPr lang="zh-CN" altLang="en-US"/>
           </a:p>
@@ -2918,7 +2910,7 @@
           <a:p>
             <a:fld id="{BDB1D72C-B286-4D77-AB41-B65B0FF94B7D}" type="datetimeFigureOut">
               <a:rPr lang="zh-CN" altLang="en-US" smtClean="0"/>
-              <a:t>2020/8/2</a:t>
+              <a:t>2020/9/8</a:t>
             </a:fld>
             <a:endParaRPr lang="zh-CN" altLang="en-US"/>
           </a:p>
@@ -3409,114 +3401,6 @@
 </p:sld>
 </file>
 
-<file path=ppt/slides/slide10.xml><?xml version="1.0" encoding="utf-8"?>
-<p:sld xmlns:a="http://schemas.openxmlformats.org/drawingml/2006/main" xmlns:r="http://schemas.openxmlformats.org/officeDocument/2006/relationships" xmlns:p="http://schemas.openxmlformats.org/presentationml/2006/main">
-  <p:cSld>
-    <p:spTree>
-      <p:nvGrpSpPr>
-        <p:cNvPr id="1" name=""/>
-        <p:cNvGrpSpPr/>
-        <p:nvPr/>
-      </p:nvGrpSpPr>
-      <p:grpSpPr>
-        <a:xfrm>
-          <a:off x="0" y="0"/>
-          <a:ext cx="0" cy="0"/>
-          <a:chOff x="0" y="0"/>
-          <a:chExt cx="0" cy="0"/>
-        </a:xfrm>
-      </p:grpSpPr>
-      <p:sp>
-        <p:nvSpPr>
-          <p:cNvPr id="2" name="标题 1">
-            <a:extLst>
-              <a:ext uri="{FF2B5EF4-FFF2-40B4-BE49-F238E27FC236}">
-                <a16:creationId xmlns:a16="http://schemas.microsoft.com/office/drawing/2014/main" id="{A694642E-BE68-4F33-81B7-11972425EB95}"/>
-              </a:ext>
-            </a:extLst>
-          </p:cNvPr>
-          <p:cNvSpPr>
-            <a:spLocks noGrp="1"/>
-          </p:cNvSpPr>
-          <p:nvPr>
-            <p:ph type="title"/>
-          </p:nvPr>
-        </p:nvSpPr>
-        <p:spPr/>
-        <p:txBody>
-          <a:bodyPr/>
-          <a:lstStyle/>
-          <a:p>
-            <a:r>
-              <a:rPr lang="en-US" altLang="zh-CN" dirty="0"/>
-              <a:t>Orchestration-</a:t>
-            </a:r>
-            <a:r>
-              <a:rPr lang="en-US" altLang="zh-CN" dirty="0" err="1"/>
-              <a:t>ServerController</a:t>
-            </a:r>
-            <a:r>
-              <a:rPr lang="en-US" altLang="zh-CN" dirty="0"/>
-              <a:t> Interface</a:t>
-            </a:r>
-            <a:endParaRPr lang="zh-CN" altLang="en-US" dirty="0"/>
-          </a:p>
-        </p:txBody>
-      </p:sp>
-      <p:sp>
-        <p:nvSpPr>
-          <p:cNvPr id="3" name="内容占位符 2">
-            <a:extLst>
-              <a:ext uri="{FF2B5EF4-FFF2-40B4-BE49-F238E27FC236}">
-                <a16:creationId xmlns:a16="http://schemas.microsoft.com/office/drawing/2014/main" id="{671CCD60-0488-4D24-8648-9C3D5C409465}"/>
-              </a:ext>
-            </a:extLst>
-          </p:cNvPr>
-          <p:cNvSpPr>
-            <a:spLocks noGrp="1"/>
-          </p:cNvSpPr>
-          <p:nvPr>
-            <p:ph idx="1"/>
-          </p:nvPr>
-        </p:nvSpPr>
-        <p:spPr/>
-        <p:txBody>
-          <a:bodyPr/>
-          <a:lstStyle/>
-          <a:p>
-            <a:r>
-              <a:rPr lang="en-US" altLang="zh-CN" dirty="0"/>
-              <a:t>Send </a:t>
-            </a:r>
-            <a:r>
-              <a:rPr lang="en-US" altLang="zh-CN" dirty="0" err="1"/>
-              <a:t>DeploySFCIinServerCmd</a:t>
-            </a:r>
-            <a:endParaRPr lang="en-US" altLang="zh-CN" dirty="0"/>
-          </a:p>
-          <a:p>
-            <a:pPr lvl="1"/>
-            <a:r>
-              <a:rPr lang="en-US" altLang="zh-CN" dirty="0" err="1"/>
-              <a:t>vnfi</a:t>
-            </a:r>
-            <a:endParaRPr lang="en-US" altLang="zh-CN" dirty="0"/>
-          </a:p>
-        </p:txBody>
-      </p:sp>
-    </p:spTree>
-    <p:extLst>
-      <p:ext uri="{BB962C8B-B14F-4D97-AF65-F5344CB8AC3E}">
-        <p14:creationId xmlns:p14="http://schemas.microsoft.com/office/powerpoint/2010/main" val="1462162866"/>
-      </p:ext>
-    </p:extLst>
-  </p:cSld>
-  <p:clrMapOvr>
-    <a:masterClrMapping/>
-  </p:clrMapOvr>
-</p:sld>
-</file>
-
 <file path=ppt/slides/slide2.xml><?xml version="1.0" encoding="utf-8"?>
 <p:sld xmlns:a="http://schemas.openxmlformats.org/drawingml/2006/main" xmlns:r="http://schemas.openxmlformats.org/officeDocument/2006/relationships" xmlns:p="http://schemas.openxmlformats.org/presentationml/2006/main">
   <p:cSld>
@@ -3739,7 +3623,7 @@
           <a:p>
             <a:r>
               <a:rPr lang="en-US" altLang="zh-CN" dirty="0"/>
-              <a:t>SAM Design - Orchestration</a:t>
+              <a:t>SAM Design – Orchestration-Old</a:t>
             </a:r>
             <a:endParaRPr lang="zh-CN" altLang="en-US" dirty="0"/>
           </a:p>
@@ -4654,115 +4538,6 @@
               <a:t>Acquire network data</a:t>
             </a:r>
             <a:endParaRPr lang="zh-CN" altLang="en-US" dirty="0"/>
-          </a:p>
-        </p:txBody>
-      </p:sp>
-      <p:sp>
-        <p:nvSpPr>
-          <p:cNvPr id="3" name="文本框 2">
-            <a:extLst>
-              <a:ext uri="{FF2B5EF4-FFF2-40B4-BE49-F238E27FC236}">
-                <a16:creationId xmlns:a16="http://schemas.microsoft.com/office/drawing/2014/main" id="{70525882-BB7B-419E-9B33-CB2DDF7A3FD4}"/>
-              </a:ext>
-            </a:extLst>
-          </p:cNvPr>
-          <p:cNvSpPr txBox="1"/>
-          <p:nvPr/>
-        </p:nvSpPr>
-        <p:spPr>
-          <a:xfrm>
-            <a:off x="6971907" y="1347947"/>
-            <a:ext cx="4602542" cy="923330"/>
-          </a:xfrm>
-          <a:prstGeom prst="rect">
-            <a:avLst/>
-          </a:prstGeom>
-          <a:noFill/>
-        </p:spPr>
-        <p:txBody>
-          <a:bodyPr wrap="none" rtlCol="0">
-            <a:spAutoFit/>
-          </a:bodyPr>
-          <a:lstStyle/>
-          <a:p>
-            <a:pPr marL="285750" indent="-285750">
-              <a:buFont typeface="Arial" panose="020B0604020202020204" pitchFamily="34" charset="0"/>
-              <a:buChar char="•"/>
-            </a:pPr>
-            <a:r>
-              <a:rPr lang="zh-CN" altLang="en-US" dirty="0"/>
-              <a:t>向</a:t>
-            </a:r>
-            <a:r>
-              <a:rPr lang="en-US" altLang="zh-CN" dirty="0" err="1"/>
-              <a:t>bessController</a:t>
-            </a:r>
-            <a:r>
-              <a:rPr lang="zh-CN" altLang="en-US" dirty="0"/>
-              <a:t>发送指令安装</a:t>
-            </a:r>
-            <a:r>
-              <a:rPr lang="en-US" altLang="zh-CN" dirty="0"/>
-              <a:t>/</a:t>
-            </a:r>
-            <a:r>
-              <a:rPr lang="zh-CN" altLang="en-US" dirty="0"/>
-              <a:t>删除</a:t>
-            </a:r>
-            <a:r>
-              <a:rPr lang="en-US" altLang="zh-CN" dirty="0"/>
-              <a:t>SFC</a:t>
-            </a:r>
-          </a:p>
-          <a:p>
-            <a:pPr marL="285750" indent="-285750">
-              <a:buFont typeface="Arial" panose="020B0604020202020204" pitchFamily="34" charset="0"/>
-              <a:buChar char="•"/>
-            </a:pPr>
-            <a:r>
-              <a:rPr lang="zh-CN" altLang="en-US" dirty="0"/>
-              <a:t>向</a:t>
-            </a:r>
-            <a:r>
-              <a:rPr lang="en-US" altLang="zh-CN" dirty="0" err="1"/>
-              <a:t>dockerController</a:t>
-            </a:r>
-            <a:r>
-              <a:rPr lang="zh-CN" altLang="en-US" dirty="0"/>
-              <a:t>发送指令部署</a:t>
-            </a:r>
-            <a:r>
-              <a:rPr lang="en-US" altLang="zh-CN" dirty="0"/>
-              <a:t>/</a:t>
-            </a:r>
-            <a:r>
-              <a:rPr lang="zh-CN" altLang="en-US" dirty="0"/>
-              <a:t>删除</a:t>
-            </a:r>
-            <a:r>
-              <a:rPr lang="en-US" altLang="zh-CN" dirty="0" err="1"/>
-              <a:t>vnf</a:t>
-            </a:r>
-            <a:endParaRPr lang="en-US" altLang="zh-CN" dirty="0"/>
-          </a:p>
-          <a:p>
-            <a:pPr marL="285750" indent="-285750">
-              <a:buFont typeface="Arial" panose="020B0604020202020204" pitchFamily="34" charset="0"/>
-              <a:buChar char="•"/>
-            </a:pPr>
-            <a:r>
-              <a:rPr lang="zh-CN" altLang="en-US" dirty="0"/>
-              <a:t>向</a:t>
-            </a:r>
-            <a:r>
-              <a:rPr lang="en-US" altLang="zh-CN" dirty="0"/>
-              <a:t>Ryu</a:t>
-            </a:r>
-            <a:r>
-              <a:rPr lang="zh-CN" altLang="en-US" dirty="0"/>
-              <a:t>发送指令部署流表</a:t>
-            </a:r>
-            <a:endParaRPr lang="en-US" altLang="zh-CN" dirty="0"/>
           </a:p>
         </p:txBody>
       </p:sp>
@@ -5341,812 +5116,6 @@
     <p:extLst>
       <p:ext uri="{BB962C8B-B14F-4D97-AF65-F5344CB8AC3E}">
         <p14:creationId xmlns:p14="http://schemas.microsoft.com/office/powerpoint/2010/main" val="2525845"/>
-      </p:ext>
-    </p:extLst>
-  </p:cSld>
-  <p:clrMapOvr>
-    <a:masterClrMapping/>
-  </p:clrMapOvr>
-</p:sld>
-</file>
-
-<file path=ppt/slides/slide3.xml><?xml version="1.0" encoding="utf-8"?>
-<p:sld xmlns:a="http://schemas.openxmlformats.org/drawingml/2006/main" xmlns:r="http://schemas.openxmlformats.org/officeDocument/2006/relationships" xmlns:p="http://schemas.openxmlformats.org/presentationml/2006/main">
-  <p:cSld>
-    <p:spTree>
-      <p:nvGrpSpPr>
-        <p:cNvPr id="1" name=""/>
-        <p:cNvGrpSpPr/>
-        <p:nvPr/>
-      </p:nvGrpSpPr>
-      <p:grpSpPr>
-        <a:xfrm>
-          <a:off x="0" y="0"/>
-          <a:ext cx="0" cy="0"/>
-          <a:chOff x="0" y="0"/>
-          <a:chExt cx="0" cy="0"/>
-        </a:xfrm>
-      </p:grpSpPr>
-      <p:sp>
-        <p:nvSpPr>
-          <p:cNvPr id="2" name="标题 1">
-            <a:extLst>
-              <a:ext uri="{FF2B5EF4-FFF2-40B4-BE49-F238E27FC236}">
-                <a16:creationId xmlns:a16="http://schemas.microsoft.com/office/drawing/2014/main" id="{A694642E-BE68-4F33-81B7-11972425EB95}"/>
-              </a:ext>
-            </a:extLst>
-          </p:cNvPr>
-          <p:cNvSpPr>
-            <a:spLocks noGrp="1"/>
-          </p:cNvSpPr>
-          <p:nvPr>
-            <p:ph type="title"/>
-          </p:nvPr>
-        </p:nvSpPr>
-        <p:spPr/>
-        <p:txBody>
-          <a:bodyPr/>
-          <a:lstStyle/>
-          <a:p>
-            <a:r>
-              <a:rPr lang="en-US" altLang="zh-CN" dirty="0"/>
-              <a:t>Orchestration-Database Interface</a:t>
-            </a:r>
-            <a:endParaRPr lang="zh-CN" altLang="en-US" dirty="0"/>
-          </a:p>
-        </p:txBody>
-      </p:sp>
-      <p:sp>
-        <p:nvSpPr>
-          <p:cNvPr id="3" name="内容占位符 2">
-            <a:extLst>
-              <a:ext uri="{FF2B5EF4-FFF2-40B4-BE49-F238E27FC236}">
-                <a16:creationId xmlns:a16="http://schemas.microsoft.com/office/drawing/2014/main" id="{671CCD60-0488-4D24-8648-9C3D5C409465}"/>
-              </a:ext>
-            </a:extLst>
-          </p:cNvPr>
-          <p:cNvSpPr>
-            <a:spLocks noGrp="1"/>
-          </p:cNvSpPr>
-          <p:nvPr>
-            <p:ph idx="1"/>
-          </p:nvPr>
-        </p:nvSpPr>
-        <p:spPr/>
-        <p:txBody>
-          <a:bodyPr/>
-          <a:lstStyle/>
-          <a:p>
-            <a:r>
-              <a:rPr lang="en-US" altLang="zh-CN" dirty="0" err="1"/>
-              <a:t>DatabaseAgent</a:t>
-            </a:r>
-            <a:r>
-              <a:rPr lang="en-US" altLang="zh-CN" dirty="0"/>
-              <a:t> </a:t>
-            </a:r>
-            <a:r>
-              <a:rPr lang="en-US" altLang="zh-CN" dirty="0" err="1"/>
-              <a:t>getTopology</a:t>
-            </a:r>
-            <a:r>
-              <a:rPr lang="en-US" altLang="zh-CN" dirty="0"/>
-              <a:t>() return:</a:t>
-            </a:r>
-          </a:p>
-          <a:p>
-            <a:pPr lvl="1"/>
-            <a:r>
-              <a:rPr lang="en-US" altLang="zh-CN" dirty="0"/>
-              <a:t>Switch Table</a:t>
-            </a:r>
-          </a:p>
-          <a:p>
-            <a:pPr lvl="1"/>
-            <a:r>
-              <a:rPr lang="en-US" altLang="zh-CN" dirty="0"/>
-              <a:t>DCN Gateway Table</a:t>
-            </a:r>
-          </a:p>
-          <a:p>
-            <a:pPr lvl="1"/>
-            <a:r>
-              <a:rPr lang="en-US" altLang="zh-CN" dirty="0"/>
-              <a:t>Edge Table</a:t>
-            </a:r>
-          </a:p>
-          <a:p>
-            <a:pPr lvl="1"/>
-            <a:r>
-              <a:rPr lang="en-US" altLang="zh-CN" dirty="0"/>
-              <a:t>Server Table </a:t>
-            </a:r>
-          </a:p>
-        </p:txBody>
-      </p:sp>
-    </p:spTree>
-    <p:extLst>
-      <p:ext uri="{BB962C8B-B14F-4D97-AF65-F5344CB8AC3E}">
-        <p14:creationId xmlns:p14="http://schemas.microsoft.com/office/powerpoint/2010/main" val="1825590587"/>
-      </p:ext>
-    </p:extLst>
-  </p:cSld>
-  <p:clrMapOvr>
-    <a:masterClrMapping/>
-  </p:clrMapOvr>
-</p:sld>
-</file>
-
-<file path=ppt/slides/slide4.xml><?xml version="1.0" encoding="utf-8"?>
-<p:sld xmlns:a="http://schemas.openxmlformats.org/drawingml/2006/main" xmlns:r="http://schemas.openxmlformats.org/officeDocument/2006/relationships" xmlns:p="http://schemas.openxmlformats.org/presentationml/2006/main">
-  <p:cSld>
-    <p:spTree>
-      <p:nvGrpSpPr>
-        <p:cNvPr id="1" name=""/>
-        <p:cNvGrpSpPr/>
-        <p:nvPr/>
-      </p:nvGrpSpPr>
-      <p:grpSpPr>
-        <a:xfrm>
-          <a:off x="0" y="0"/>
-          <a:ext cx="0" cy="0"/>
-          <a:chOff x="0" y="0"/>
-          <a:chExt cx="0" cy="0"/>
-        </a:xfrm>
-      </p:grpSpPr>
-      <p:sp>
-        <p:nvSpPr>
-          <p:cNvPr id="2" name="标题 1">
-            <a:extLst>
-              <a:ext uri="{FF2B5EF4-FFF2-40B4-BE49-F238E27FC236}">
-                <a16:creationId xmlns:a16="http://schemas.microsoft.com/office/drawing/2014/main" id="{A694642E-BE68-4F33-81B7-11972425EB95}"/>
-              </a:ext>
-            </a:extLst>
-          </p:cNvPr>
-          <p:cNvSpPr>
-            <a:spLocks noGrp="1"/>
-          </p:cNvSpPr>
-          <p:nvPr>
-            <p:ph type="title"/>
-          </p:nvPr>
-        </p:nvSpPr>
-        <p:spPr/>
-        <p:txBody>
-          <a:bodyPr/>
-          <a:lstStyle/>
-          <a:p>
-            <a:r>
-              <a:rPr lang="en-US" altLang="zh-CN" dirty="0" err="1"/>
-              <a:t>FrontEnd</a:t>
-            </a:r>
-            <a:r>
-              <a:rPr lang="en-US" altLang="zh-CN" dirty="0"/>
-              <a:t>-Orchestration Interface</a:t>
-            </a:r>
-            <a:endParaRPr lang="zh-CN" altLang="en-US" dirty="0"/>
-          </a:p>
-        </p:txBody>
-      </p:sp>
-      <p:sp>
-        <p:nvSpPr>
-          <p:cNvPr id="3" name="内容占位符 2">
-            <a:extLst>
-              <a:ext uri="{FF2B5EF4-FFF2-40B4-BE49-F238E27FC236}">
-                <a16:creationId xmlns:a16="http://schemas.microsoft.com/office/drawing/2014/main" id="{671CCD60-0488-4D24-8648-9C3D5C409465}"/>
-              </a:ext>
-            </a:extLst>
-          </p:cNvPr>
-          <p:cNvSpPr>
-            <a:spLocks noGrp="1"/>
-          </p:cNvSpPr>
-          <p:nvPr>
-            <p:ph idx="1"/>
-          </p:nvPr>
-        </p:nvSpPr>
-        <p:spPr/>
-        <p:txBody>
-          <a:bodyPr/>
-          <a:lstStyle/>
-          <a:p>
-            <a:r>
-              <a:rPr lang="en-US" altLang="zh-CN" dirty="0"/>
-              <a:t>Message agent listen on ORCHESTRATION_QUEUE</a:t>
-            </a:r>
-          </a:p>
-          <a:p>
-            <a:pPr lvl="1"/>
-            <a:r>
-              <a:rPr lang="en-US" altLang="zh-CN" dirty="0"/>
-              <a:t>CREATE_SFC_REQUEST (ADDSFCINST x1)</a:t>
-            </a:r>
-          </a:p>
-          <a:p>
-            <a:pPr lvl="1"/>
-            <a:r>
-              <a:rPr lang="en-US" altLang="zh-CN" dirty="0"/>
-              <a:t>DELETE_SFC_REQUEST (DELETESFCINST </a:t>
-            </a:r>
-            <a:r>
-              <a:rPr lang="en-US" altLang="zh-CN" dirty="0" err="1"/>
-              <a:t>xTimes</a:t>
-            </a:r>
-            <a:r>
-              <a:rPr lang="en-US" altLang="zh-CN" dirty="0"/>
-              <a:t>)</a:t>
-            </a:r>
-          </a:p>
-          <a:p>
-            <a:pPr lvl="1"/>
-            <a:r>
-              <a:rPr lang="en-US" altLang="zh-CN" dirty="0"/>
-              <a:t>GET_SFC_REQUEST</a:t>
-            </a:r>
-          </a:p>
-          <a:p>
-            <a:pPr lvl="1"/>
-            <a:r>
-              <a:rPr lang="en-US" altLang="zh-CN" dirty="0"/>
-              <a:t>GETALL_SFC_REQUEST</a:t>
-            </a:r>
-          </a:p>
-          <a:p>
-            <a:pPr lvl="1"/>
-            <a:r>
-              <a:rPr lang="en-US" altLang="zh-CN" dirty="0"/>
-              <a:t>ADDSFCINST</a:t>
-            </a:r>
-          </a:p>
-          <a:p>
-            <a:pPr lvl="1"/>
-            <a:r>
-              <a:rPr lang="en-US" altLang="zh-CN" dirty="0"/>
-              <a:t>DELETESFCINST</a:t>
-            </a:r>
-          </a:p>
-          <a:p>
-            <a:pPr lvl="1"/>
-            <a:endParaRPr lang="en-US" altLang="zh-CN" dirty="0"/>
-          </a:p>
-        </p:txBody>
-      </p:sp>
-    </p:spTree>
-    <p:extLst>
-      <p:ext uri="{BB962C8B-B14F-4D97-AF65-F5344CB8AC3E}">
-        <p14:creationId xmlns:p14="http://schemas.microsoft.com/office/powerpoint/2010/main" val="2297813020"/>
-      </p:ext>
-    </p:extLst>
-  </p:cSld>
-  <p:clrMapOvr>
-    <a:masterClrMapping/>
-  </p:clrMapOvr>
-</p:sld>
-</file>
-
-<file path=ppt/slides/slide5.xml><?xml version="1.0" encoding="utf-8"?>
-<p:sld xmlns:a="http://schemas.openxmlformats.org/drawingml/2006/main" xmlns:r="http://schemas.openxmlformats.org/officeDocument/2006/relationships" xmlns:p="http://schemas.openxmlformats.org/presentationml/2006/main">
-  <p:cSld>
-    <p:spTree>
-      <p:nvGrpSpPr>
-        <p:cNvPr id="1" name=""/>
-        <p:cNvGrpSpPr/>
-        <p:nvPr/>
-      </p:nvGrpSpPr>
-      <p:grpSpPr>
-        <a:xfrm>
-          <a:off x="0" y="0"/>
-          <a:ext cx="0" cy="0"/>
-          <a:chOff x="0" y="0"/>
-          <a:chExt cx="0" cy="0"/>
-        </a:xfrm>
-      </p:grpSpPr>
-      <p:sp>
-        <p:nvSpPr>
-          <p:cNvPr id="2" name="标题 1">
-            <a:extLst>
-              <a:ext uri="{FF2B5EF4-FFF2-40B4-BE49-F238E27FC236}">
-                <a16:creationId xmlns:a16="http://schemas.microsoft.com/office/drawing/2014/main" id="{A694642E-BE68-4F33-81B7-11972425EB95}"/>
-              </a:ext>
-            </a:extLst>
-          </p:cNvPr>
-          <p:cNvSpPr>
-            <a:spLocks noGrp="1"/>
-          </p:cNvSpPr>
-          <p:nvPr>
-            <p:ph type="title"/>
-          </p:nvPr>
-        </p:nvSpPr>
-        <p:spPr/>
-        <p:txBody>
-          <a:bodyPr/>
-          <a:lstStyle/>
-          <a:p>
-            <a:r>
-              <a:rPr lang="en-US" altLang="zh-CN" dirty="0" err="1"/>
-              <a:t>AdaptiveSystem</a:t>
-            </a:r>
-            <a:r>
-              <a:rPr lang="en-US" altLang="zh-CN" dirty="0"/>
-              <a:t>-Orchestration Interface</a:t>
-            </a:r>
-            <a:endParaRPr lang="zh-CN" altLang="en-US" dirty="0"/>
-          </a:p>
-        </p:txBody>
-      </p:sp>
-      <p:sp>
-        <p:nvSpPr>
-          <p:cNvPr id="3" name="内容占位符 2">
-            <a:extLst>
-              <a:ext uri="{FF2B5EF4-FFF2-40B4-BE49-F238E27FC236}">
-                <a16:creationId xmlns:a16="http://schemas.microsoft.com/office/drawing/2014/main" id="{671CCD60-0488-4D24-8648-9C3D5C409465}"/>
-              </a:ext>
-            </a:extLst>
-          </p:cNvPr>
-          <p:cNvSpPr>
-            <a:spLocks noGrp="1"/>
-          </p:cNvSpPr>
-          <p:nvPr>
-            <p:ph idx="1"/>
-          </p:nvPr>
-        </p:nvSpPr>
-        <p:spPr/>
-        <p:txBody>
-          <a:bodyPr/>
-          <a:lstStyle/>
-          <a:p>
-            <a:r>
-              <a:rPr lang="en-US" altLang="zh-CN" dirty="0"/>
-              <a:t>Message agent listen on ORCHESTRATION_QUEUE</a:t>
-            </a:r>
-          </a:p>
-          <a:p>
-            <a:pPr lvl="1"/>
-            <a:r>
-              <a:rPr lang="en-US" altLang="zh-CN" dirty="0"/>
-              <a:t>ADDSFCINST</a:t>
-            </a:r>
-          </a:p>
-          <a:p>
-            <a:pPr lvl="1"/>
-            <a:r>
-              <a:rPr lang="en-US" altLang="zh-CN" dirty="0"/>
-              <a:t>DELETESFCINST</a:t>
-            </a:r>
-          </a:p>
-          <a:p>
-            <a:pPr lvl="1"/>
-            <a:endParaRPr lang="en-US" altLang="zh-CN" dirty="0"/>
-          </a:p>
-        </p:txBody>
-      </p:sp>
-    </p:spTree>
-    <p:extLst>
-      <p:ext uri="{BB962C8B-B14F-4D97-AF65-F5344CB8AC3E}">
-        <p14:creationId xmlns:p14="http://schemas.microsoft.com/office/powerpoint/2010/main" val="971895885"/>
-      </p:ext>
-    </p:extLst>
-  </p:cSld>
-  <p:clrMapOvr>
-    <a:masterClrMapping/>
-  </p:clrMapOvr>
-</p:sld>
-</file>
-
-<file path=ppt/slides/slide6.xml><?xml version="1.0" encoding="utf-8"?>
-<p:sld xmlns:a="http://schemas.openxmlformats.org/drawingml/2006/main" xmlns:r="http://schemas.openxmlformats.org/officeDocument/2006/relationships" xmlns:p="http://schemas.openxmlformats.org/presentationml/2006/main">
-  <p:cSld>
-    <p:spTree>
-      <p:nvGrpSpPr>
-        <p:cNvPr id="1" name=""/>
-        <p:cNvGrpSpPr/>
-        <p:nvPr/>
-      </p:nvGrpSpPr>
-      <p:grpSpPr>
-        <a:xfrm>
-          <a:off x="0" y="0"/>
-          <a:ext cx="0" cy="0"/>
-          <a:chOff x="0" y="0"/>
-          <a:chExt cx="0" cy="0"/>
-        </a:xfrm>
-      </p:grpSpPr>
-      <p:sp>
-        <p:nvSpPr>
-          <p:cNvPr id="2" name="标题 1">
-            <a:extLst>
-              <a:ext uri="{FF2B5EF4-FFF2-40B4-BE49-F238E27FC236}">
-                <a16:creationId xmlns:a16="http://schemas.microsoft.com/office/drawing/2014/main" id="{1854DDAB-56B7-475C-88DA-D1A9B36312CB}"/>
-              </a:ext>
-            </a:extLst>
-          </p:cNvPr>
-          <p:cNvSpPr>
-            <a:spLocks noGrp="1"/>
-          </p:cNvSpPr>
-          <p:nvPr>
-            <p:ph type="title"/>
-          </p:nvPr>
-        </p:nvSpPr>
-        <p:spPr/>
-        <p:txBody>
-          <a:bodyPr/>
-          <a:lstStyle/>
-          <a:p>
-            <a:r>
-              <a:rPr lang="en-US" altLang="zh-CN" dirty="0"/>
-              <a:t>Orchestration-Mapping Interface</a:t>
-            </a:r>
-            <a:endParaRPr lang="zh-CN" altLang="en-US" dirty="0"/>
-          </a:p>
-        </p:txBody>
-      </p:sp>
-      <p:sp>
-        <p:nvSpPr>
-          <p:cNvPr id="3" name="内容占位符 2">
-            <a:extLst>
-              <a:ext uri="{FF2B5EF4-FFF2-40B4-BE49-F238E27FC236}">
-                <a16:creationId xmlns:a16="http://schemas.microsoft.com/office/drawing/2014/main" id="{D368AE73-DCC6-4E01-9F4B-3B3F6F162E84}"/>
-              </a:ext>
-            </a:extLst>
-          </p:cNvPr>
-          <p:cNvSpPr>
-            <a:spLocks noGrp="1"/>
-          </p:cNvSpPr>
-          <p:nvPr>
-            <p:ph idx="1"/>
-          </p:nvPr>
-        </p:nvSpPr>
-        <p:spPr/>
-        <p:txBody>
-          <a:bodyPr/>
-          <a:lstStyle/>
-          <a:p>
-            <a:r>
-              <a:rPr lang="en-US" altLang="zh-CN" dirty="0"/>
-              <a:t>Send server table (with ingress and egress marked), SFC</a:t>
-            </a:r>
-          </a:p>
-          <a:p>
-            <a:r>
-              <a:rPr lang="en-US" altLang="zh-CN" dirty="0"/>
-              <a:t>Receive </a:t>
-            </a:r>
-            <a:r>
-              <a:rPr lang="en-US" altLang="zh-CN" dirty="0" err="1"/>
-              <a:t>vnfi</a:t>
-            </a:r>
-            <a:endParaRPr lang="zh-CN" altLang="en-US" dirty="0"/>
-          </a:p>
-        </p:txBody>
-      </p:sp>
-    </p:spTree>
-    <p:extLst>
-      <p:ext uri="{BB962C8B-B14F-4D97-AF65-F5344CB8AC3E}">
-        <p14:creationId xmlns:p14="http://schemas.microsoft.com/office/powerpoint/2010/main" val="2054251483"/>
-      </p:ext>
-    </p:extLst>
-  </p:cSld>
-  <p:clrMapOvr>
-    <a:masterClrMapping/>
-  </p:clrMapOvr>
-</p:sld>
-</file>
-
-<file path=ppt/slides/slide7.xml><?xml version="1.0" encoding="utf-8"?>
-<p:sld xmlns:a="http://schemas.openxmlformats.org/drawingml/2006/main" xmlns:r="http://schemas.openxmlformats.org/officeDocument/2006/relationships" xmlns:p="http://schemas.openxmlformats.org/presentationml/2006/main">
-  <p:cSld>
-    <p:spTree>
-      <p:nvGrpSpPr>
-        <p:cNvPr id="1" name=""/>
-        <p:cNvGrpSpPr/>
-        <p:nvPr/>
-      </p:nvGrpSpPr>
-      <p:grpSpPr>
-        <a:xfrm>
-          <a:off x="0" y="0"/>
-          <a:ext cx="0" cy="0"/>
-          <a:chOff x="0" y="0"/>
-          <a:chExt cx="0" cy="0"/>
-        </a:xfrm>
-      </p:grpSpPr>
-      <p:sp>
-        <p:nvSpPr>
-          <p:cNvPr id="2" name="标题 1">
-            <a:extLst>
-              <a:ext uri="{FF2B5EF4-FFF2-40B4-BE49-F238E27FC236}">
-                <a16:creationId xmlns:a16="http://schemas.microsoft.com/office/drawing/2014/main" id="{1854DDAB-56B7-475C-88DA-D1A9B36312CB}"/>
-              </a:ext>
-            </a:extLst>
-          </p:cNvPr>
-          <p:cNvSpPr>
-            <a:spLocks noGrp="1"/>
-          </p:cNvSpPr>
-          <p:nvPr>
-            <p:ph type="title"/>
-          </p:nvPr>
-        </p:nvSpPr>
-        <p:spPr/>
-        <p:txBody>
-          <a:bodyPr/>
-          <a:lstStyle/>
-          <a:p>
-            <a:r>
-              <a:rPr lang="en-US" altLang="zh-CN" dirty="0"/>
-              <a:t>Orchestration-UFFR Interface</a:t>
-            </a:r>
-            <a:endParaRPr lang="zh-CN" altLang="en-US" dirty="0"/>
-          </a:p>
-        </p:txBody>
-      </p:sp>
-      <p:sp>
-        <p:nvSpPr>
-          <p:cNvPr id="3" name="内容占位符 2">
-            <a:extLst>
-              <a:ext uri="{FF2B5EF4-FFF2-40B4-BE49-F238E27FC236}">
-                <a16:creationId xmlns:a16="http://schemas.microsoft.com/office/drawing/2014/main" id="{D368AE73-DCC6-4E01-9F4B-3B3F6F162E84}"/>
-              </a:ext>
-            </a:extLst>
-          </p:cNvPr>
-          <p:cNvSpPr>
-            <a:spLocks noGrp="1"/>
-          </p:cNvSpPr>
-          <p:nvPr>
-            <p:ph idx="1"/>
-          </p:nvPr>
-        </p:nvSpPr>
-        <p:spPr/>
-        <p:txBody>
-          <a:bodyPr/>
-          <a:lstStyle/>
-          <a:p>
-            <a:r>
-              <a:rPr lang="en-US" altLang="zh-CN" dirty="0"/>
-              <a:t>Send server table (with ingress and egress marked), SFC, </a:t>
-            </a:r>
-            <a:r>
-              <a:rPr lang="en-US" altLang="zh-CN" dirty="0" err="1"/>
-              <a:t>vnfi</a:t>
-            </a:r>
-            <a:r>
-              <a:rPr lang="en-US" altLang="zh-CN" dirty="0"/>
-              <a:t>, switch table (with ingress and egress marked), links table</a:t>
-            </a:r>
-          </a:p>
-          <a:p>
-            <a:r>
-              <a:rPr lang="en-US" altLang="zh-CN" dirty="0"/>
-              <a:t>Receive </a:t>
-            </a:r>
-            <a:r>
-              <a:rPr lang="en-US" altLang="zh-CN" dirty="0" err="1"/>
-              <a:t>sfci</a:t>
-            </a:r>
-            <a:endParaRPr lang="zh-CN" altLang="en-US" dirty="0"/>
-          </a:p>
-        </p:txBody>
-      </p:sp>
-    </p:spTree>
-    <p:extLst>
-      <p:ext uri="{BB962C8B-B14F-4D97-AF65-F5344CB8AC3E}">
-        <p14:creationId xmlns:p14="http://schemas.microsoft.com/office/powerpoint/2010/main" val="2963640145"/>
-      </p:ext>
-    </p:extLst>
-  </p:cSld>
-  <p:clrMapOvr>
-    <a:masterClrMapping/>
-  </p:clrMapOvr>
-</p:sld>
-</file>
-
-<file path=ppt/slides/slide8.xml><?xml version="1.0" encoding="utf-8"?>
-<p:sld xmlns:a="http://schemas.openxmlformats.org/drawingml/2006/main" xmlns:r="http://schemas.openxmlformats.org/officeDocument/2006/relationships" xmlns:p="http://schemas.openxmlformats.org/presentationml/2006/main">
-  <p:cSld>
-    <p:spTree>
-      <p:nvGrpSpPr>
-        <p:cNvPr id="1" name=""/>
-        <p:cNvGrpSpPr/>
-        <p:nvPr/>
-      </p:nvGrpSpPr>
-      <p:grpSpPr>
-        <a:xfrm>
-          <a:off x="0" y="0"/>
-          <a:ext cx="0" cy="0"/>
-          <a:chOff x="0" y="0"/>
-          <a:chExt cx="0" cy="0"/>
-        </a:xfrm>
-      </p:grpSpPr>
-      <p:sp>
-        <p:nvSpPr>
-          <p:cNvPr id="2" name="标题 1">
-            <a:extLst>
-              <a:ext uri="{FF2B5EF4-FFF2-40B4-BE49-F238E27FC236}">
-                <a16:creationId xmlns:a16="http://schemas.microsoft.com/office/drawing/2014/main" id="{A694642E-BE68-4F33-81B7-11972425EB95}"/>
-              </a:ext>
-            </a:extLst>
-          </p:cNvPr>
-          <p:cNvSpPr>
-            <a:spLocks noGrp="1"/>
-          </p:cNvSpPr>
-          <p:nvPr>
-            <p:ph type="title"/>
-          </p:nvPr>
-        </p:nvSpPr>
-        <p:spPr/>
-        <p:txBody>
-          <a:bodyPr/>
-          <a:lstStyle/>
-          <a:p>
-            <a:r>
-              <a:rPr lang="en-US" altLang="zh-CN" dirty="0"/>
-              <a:t>Orchestration-</a:t>
-            </a:r>
-            <a:r>
-              <a:rPr lang="en-US" altLang="zh-CN" dirty="0" err="1"/>
-              <a:t>NetworkController</a:t>
-            </a:r>
-            <a:r>
-              <a:rPr lang="en-US" altLang="zh-CN" dirty="0"/>
-              <a:t> Interface</a:t>
-            </a:r>
-            <a:endParaRPr lang="zh-CN" altLang="en-US" dirty="0"/>
-          </a:p>
-        </p:txBody>
-      </p:sp>
-      <p:sp>
-        <p:nvSpPr>
-          <p:cNvPr id="3" name="内容占位符 2">
-            <a:extLst>
-              <a:ext uri="{FF2B5EF4-FFF2-40B4-BE49-F238E27FC236}">
-                <a16:creationId xmlns:a16="http://schemas.microsoft.com/office/drawing/2014/main" id="{671CCD60-0488-4D24-8648-9C3D5C409465}"/>
-              </a:ext>
-            </a:extLst>
-          </p:cNvPr>
-          <p:cNvSpPr>
-            <a:spLocks noGrp="1"/>
-          </p:cNvSpPr>
-          <p:nvPr>
-            <p:ph idx="1"/>
-          </p:nvPr>
-        </p:nvSpPr>
-        <p:spPr/>
-        <p:txBody>
-          <a:bodyPr/>
-          <a:lstStyle/>
-          <a:p>
-            <a:r>
-              <a:rPr lang="en-US" altLang="zh-CN" dirty="0"/>
-              <a:t>Send DeployRoute2IngressCmd</a:t>
-            </a:r>
-          </a:p>
-          <a:p>
-            <a:pPr lvl="1"/>
-            <a:r>
-              <a:rPr lang="en-US" altLang="zh-CN" dirty="0" err="1"/>
-              <a:t>sfc</a:t>
-            </a:r>
-            <a:endParaRPr lang="en-US" altLang="zh-CN" dirty="0"/>
-          </a:p>
-          <a:p>
-            <a:r>
-              <a:rPr lang="en-US" altLang="zh-CN" dirty="0"/>
-              <a:t>Function: deploy source -&gt; ingress rule</a:t>
-            </a:r>
-          </a:p>
-        </p:txBody>
-      </p:sp>
-    </p:spTree>
-    <p:extLst>
-      <p:ext uri="{BB962C8B-B14F-4D97-AF65-F5344CB8AC3E}">
-        <p14:creationId xmlns:p14="http://schemas.microsoft.com/office/powerpoint/2010/main" val="4097312460"/>
-      </p:ext>
-    </p:extLst>
-  </p:cSld>
-  <p:clrMapOvr>
-    <a:masterClrMapping/>
-  </p:clrMapOvr>
-</p:sld>
-</file>
-
-<file path=ppt/slides/slide9.xml><?xml version="1.0" encoding="utf-8"?>
-<p:sld xmlns:a="http://schemas.openxmlformats.org/drawingml/2006/main" xmlns:r="http://schemas.openxmlformats.org/officeDocument/2006/relationships" xmlns:p="http://schemas.openxmlformats.org/presentationml/2006/main">
-  <p:cSld>
-    <p:spTree>
-      <p:nvGrpSpPr>
-        <p:cNvPr id="1" name=""/>
-        <p:cNvGrpSpPr/>
-        <p:nvPr/>
-      </p:nvGrpSpPr>
-      <p:grpSpPr>
-        <a:xfrm>
-          <a:off x="0" y="0"/>
-          <a:ext cx="0" cy="0"/>
-          <a:chOff x="0" y="0"/>
-          <a:chExt cx="0" cy="0"/>
-        </a:xfrm>
-      </p:grpSpPr>
-      <p:sp>
-        <p:nvSpPr>
-          <p:cNvPr id="2" name="标题 1">
-            <a:extLst>
-              <a:ext uri="{FF2B5EF4-FFF2-40B4-BE49-F238E27FC236}">
-                <a16:creationId xmlns:a16="http://schemas.microsoft.com/office/drawing/2014/main" id="{A694642E-BE68-4F33-81B7-11972425EB95}"/>
-              </a:ext>
-            </a:extLst>
-          </p:cNvPr>
-          <p:cNvSpPr>
-            <a:spLocks noGrp="1"/>
-          </p:cNvSpPr>
-          <p:nvPr>
-            <p:ph type="title"/>
-          </p:nvPr>
-        </p:nvSpPr>
-        <p:spPr/>
-        <p:txBody>
-          <a:bodyPr/>
-          <a:lstStyle/>
-          <a:p>
-            <a:r>
-              <a:rPr lang="en-US" altLang="zh-CN" dirty="0"/>
-              <a:t>Orchestration-</a:t>
-            </a:r>
-            <a:r>
-              <a:rPr lang="en-US" altLang="zh-CN" dirty="0" err="1"/>
-              <a:t>NetworkController</a:t>
-            </a:r>
-            <a:r>
-              <a:rPr lang="en-US" altLang="zh-CN" dirty="0"/>
-              <a:t> Interface</a:t>
-            </a:r>
-            <a:endParaRPr lang="zh-CN" altLang="en-US" dirty="0"/>
-          </a:p>
-        </p:txBody>
-      </p:sp>
-      <p:sp>
-        <p:nvSpPr>
-          <p:cNvPr id="3" name="内容占位符 2">
-            <a:extLst>
-              <a:ext uri="{FF2B5EF4-FFF2-40B4-BE49-F238E27FC236}">
-                <a16:creationId xmlns:a16="http://schemas.microsoft.com/office/drawing/2014/main" id="{671CCD60-0488-4D24-8648-9C3D5C409465}"/>
-              </a:ext>
-            </a:extLst>
-          </p:cNvPr>
-          <p:cNvSpPr>
-            <a:spLocks noGrp="1"/>
-          </p:cNvSpPr>
-          <p:nvPr>
-            <p:ph idx="1"/>
-          </p:nvPr>
-        </p:nvSpPr>
-        <p:spPr/>
-        <p:txBody>
-          <a:bodyPr/>
-          <a:lstStyle/>
-          <a:p>
-            <a:r>
-              <a:rPr lang="en-US" altLang="zh-CN" dirty="0"/>
-              <a:t>Send </a:t>
-            </a:r>
-            <a:r>
-              <a:rPr lang="en-US" altLang="zh-CN" dirty="0" err="1"/>
-              <a:t>AddSFCIinSwitchCmd</a:t>
-            </a:r>
-            <a:endParaRPr lang="en-US" altLang="zh-CN" dirty="0"/>
-          </a:p>
-          <a:p>
-            <a:pPr lvl="1"/>
-            <a:r>
-              <a:rPr lang="en-US" altLang="zh-CN" dirty="0" err="1"/>
-              <a:t>sfci</a:t>
-            </a:r>
-            <a:endParaRPr lang="en-US" altLang="zh-CN" dirty="0"/>
-          </a:p>
-          <a:p>
-            <a:pPr lvl="1"/>
-            <a:endParaRPr lang="zh-CN" altLang="en-US" dirty="0"/>
-          </a:p>
-        </p:txBody>
-      </p:sp>
-    </p:spTree>
-    <p:extLst>
-      <p:ext uri="{BB962C8B-B14F-4D97-AF65-F5344CB8AC3E}">
-        <p14:creationId xmlns:p14="http://schemas.microsoft.com/office/powerpoint/2010/main" val="1929898141"/>
       </p:ext>
     </p:extLst>
   </p:cSld>

</xml_diff>